<commit_message>
add API to aggregate, start dev on container app
</commit_message>
<xml_diff>
--- a/accelerators/stream_manager/docs/Master Images.pptx
+++ b/accelerators/stream_manager/docs/Master Images.pptx
@@ -11581,10 +11581,10 @@
       </p:grpSp>
       <p:grpSp>
         <p:nvGrpSpPr>
-          <p:cNvPr id="52" name="Group 51">
-            <a:extLst>
-              <a:ext uri="{FF2B5EF4-FFF2-40B4-BE49-F238E27FC236}">
-                <a16:creationId xmlns:a16="http://schemas.microsoft.com/office/drawing/2014/main" id="{4CD0AE0B-D808-F74F-8725-6D8EF4579570}"/>
+          <p:cNvPr id="88" name="Group 87">
+            <a:extLst>
+              <a:ext uri="{FF2B5EF4-FFF2-40B4-BE49-F238E27FC236}">
+                <a16:creationId xmlns:a16="http://schemas.microsoft.com/office/drawing/2014/main" id="{92EF8515-AF10-B849-86EB-E2815E3382D3}"/>
               </a:ext>
             </a:extLst>
           </p:cNvPr>
@@ -11593,10 +11593,10 @@
         </p:nvGrpSpPr>
         <p:grpSpPr>
           <a:xfrm>
-            <a:off x="3003854" y="2619329"/>
-            <a:ext cx="731520" cy="1057409"/>
-            <a:chOff x="3472506" y="4905793"/>
-            <a:chExt cx="731520" cy="1057409"/>
+            <a:off x="2969071" y="2607817"/>
+            <a:ext cx="814720" cy="1057409"/>
+            <a:chOff x="3003854" y="2619329"/>
+            <a:chExt cx="814720" cy="1057409"/>
           </a:xfrm>
         </p:grpSpPr>
         <p:pic>
@@ -11627,7 +11627,7 @@
           </p:blipFill>
           <p:spPr>
             <a:xfrm>
-              <a:off x="3615725" y="4905793"/>
+              <a:off x="3176264" y="2619329"/>
               <a:ext cx="469900" cy="469900"/>
             </a:xfrm>
             <a:prstGeom prst="rect">
@@ -11649,8 +11649,8 @@
           </p:nvSpPr>
           <p:spPr>
             <a:xfrm>
-              <a:off x="3472506" y="5414562"/>
-              <a:ext cx="731520" cy="548640"/>
+              <a:off x="3003854" y="3128098"/>
+              <a:ext cx="814720" cy="548640"/>
             </a:xfrm>
             <a:prstGeom prst="rect">
               <a:avLst/>

</xml_diff>

<commit_message>
flask app functionally complete
</commit_message>
<xml_diff>
--- a/accelerators/stream_manager/docs/Master Images.pptx
+++ b/accelerators/stream_manager/docs/Master Images.pptx
@@ -200,7 +200,7 @@
           <a:p>
             <a:fld id="{C651EA68-8216-444B-A9B9-6AB7A53198D1}" type="datetimeFigureOut">
               <a:rPr lang="en-US" smtClean="0"/>
-              <a:t>2/24/20</a:t>
+              <a:t>2/26/20</a:t>
             </a:fld>
             <a:endParaRPr lang="en-US"/>
           </a:p>
@@ -782,7 +782,7 @@
           <a:p>
             <a:fld id="{0191ADAD-C447-434A-91E8-24A385BB7D2D}" type="datetimeFigureOut">
               <a:rPr lang="en-US" smtClean="0"/>
-              <a:t>2/24/20</a:t>
+              <a:t>2/26/20</a:t>
             </a:fld>
             <a:endParaRPr lang="en-US"/>
           </a:p>
@@ -980,7 +980,7 @@
           <a:p>
             <a:fld id="{0191ADAD-C447-434A-91E8-24A385BB7D2D}" type="datetimeFigureOut">
               <a:rPr lang="en-US" smtClean="0"/>
-              <a:t>2/24/20</a:t>
+              <a:t>2/26/20</a:t>
             </a:fld>
             <a:endParaRPr lang="en-US"/>
           </a:p>
@@ -1188,7 +1188,7 @@
           <a:p>
             <a:fld id="{0191ADAD-C447-434A-91E8-24A385BB7D2D}" type="datetimeFigureOut">
               <a:rPr lang="en-US" smtClean="0"/>
-              <a:t>2/24/20</a:t>
+              <a:t>2/26/20</a:t>
             </a:fld>
             <a:endParaRPr lang="en-US"/>
           </a:p>
@@ -1386,7 +1386,7 @@
           <a:p>
             <a:fld id="{0191ADAD-C447-434A-91E8-24A385BB7D2D}" type="datetimeFigureOut">
               <a:rPr lang="en-US" smtClean="0"/>
-              <a:t>2/24/20</a:t>
+              <a:t>2/26/20</a:t>
             </a:fld>
             <a:endParaRPr lang="en-US"/>
           </a:p>
@@ -1661,7 +1661,7 @@
           <a:p>
             <a:fld id="{0191ADAD-C447-434A-91E8-24A385BB7D2D}" type="datetimeFigureOut">
               <a:rPr lang="en-US" smtClean="0"/>
-              <a:t>2/24/20</a:t>
+              <a:t>2/26/20</a:t>
             </a:fld>
             <a:endParaRPr lang="en-US"/>
           </a:p>
@@ -1926,7 +1926,7 @@
           <a:p>
             <a:fld id="{0191ADAD-C447-434A-91E8-24A385BB7D2D}" type="datetimeFigureOut">
               <a:rPr lang="en-US" smtClean="0"/>
-              <a:t>2/24/20</a:t>
+              <a:t>2/26/20</a:t>
             </a:fld>
             <a:endParaRPr lang="en-US"/>
           </a:p>
@@ -2338,7 +2338,7 @@
           <a:p>
             <a:fld id="{0191ADAD-C447-434A-91E8-24A385BB7D2D}" type="datetimeFigureOut">
               <a:rPr lang="en-US" smtClean="0"/>
-              <a:t>2/24/20</a:t>
+              <a:t>2/26/20</a:t>
             </a:fld>
             <a:endParaRPr lang="en-US"/>
           </a:p>
@@ -2479,7 +2479,7 @@
           <a:p>
             <a:fld id="{0191ADAD-C447-434A-91E8-24A385BB7D2D}" type="datetimeFigureOut">
               <a:rPr lang="en-US" smtClean="0"/>
-              <a:t>2/24/20</a:t>
+              <a:t>2/26/20</a:t>
             </a:fld>
             <a:endParaRPr lang="en-US"/>
           </a:p>
@@ -2592,7 +2592,7 @@
           <a:p>
             <a:fld id="{0191ADAD-C447-434A-91E8-24A385BB7D2D}" type="datetimeFigureOut">
               <a:rPr lang="en-US" smtClean="0"/>
-              <a:t>2/24/20</a:t>
+              <a:t>2/26/20</a:t>
             </a:fld>
             <a:endParaRPr lang="en-US"/>
           </a:p>
@@ -2903,7 +2903,7 @@
           <a:p>
             <a:fld id="{0191ADAD-C447-434A-91E8-24A385BB7D2D}" type="datetimeFigureOut">
               <a:rPr lang="en-US" smtClean="0"/>
-              <a:t>2/24/20</a:t>
+              <a:t>2/26/20</a:t>
             </a:fld>
             <a:endParaRPr lang="en-US"/>
           </a:p>
@@ -3191,7 +3191,7 @@
           <a:p>
             <a:fld id="{0191ADAD-C447-434A-91E8-24A385BB7D2D}" type="datetimeFigureOut">
               <a:rPr lang="en-US" smtClean="0"/>
-              <a:t>2/24/20</a:t>
+              <a:t>2/26/20</a:t>
             </a:fld>
             <a:endParaRPr lang="en-US"/>
           </a:p>
@@ -3432,7 +3432,7 @@
           <a:p>
             <a:fld id="{0191ADAD-C447-434A-91E8-24A385BB7D2D}" type="datetimeFigureOut">
               <a:rPr lang="en-US" smtClean="0"/>
-              <a:t>2/24/20</a:t>
+              <a:t>2/26/20</a:t>
             </a:fld>
             <a:endParaRPr lang="en-US"/>
           </a:p>
@@ -11256,9 +11256,9 @@
         <p:grpSpPr>
           <a:xfrm>
             <a:off x="250208" y="2908068"/>
-            <a:ext cx="1895950" cy="1351521"/>
+            <a:ext cx="1895950" cy="1136078"/>
             <a:chOff x="301274" y="2616153"/>
-            <a:chExt cx="1513305" cy="851903"/>
+            <a:chExt cx="1513305" cy="716103"/>
           </a:xfrm>
         </p:grpSpPr>
         <p:sp>
@@ -11276,7 +11276,7 @@
           <p:spPr>
             <a:xfrm>
               <a:off x="301274" y="3002455"/>
-              <a:ext cx="1513305" cy="465601"/>
+              <a:ext cx="1513305" cy="329801"/>
             </a:xfrm>
             <a:prstGeom prst="rect">
               <a:avLst/>
@@ -11299,7 +11299,7 @@
               <a:pPr algn="ctr"/>
               <a:r>
                 <a:rPr lang="en-US" sz="1400" dirty="0"/>
-                <a:t>(Local Display &amp; Control)</a:t>
+                <a:t>(Local Display)</a:t>
               </a:r>
             </a:p>
           </p:txBody>
@@ -11682,10 +11682,10 @@
       </p:grpSp>
       <p:sp>
         <p:nvSpPr>
-          <p:cNvPr id="57" name="Freeform 56">
-            <a:extLst>
-              <a:ext uri="{FF2B5EF4-FFF2-40B4-BE49-F238E27FC236}">
-                <a16:creationId xmlns:a16="http://schemas.microsoft.com/office/drawing/2014/main" id="{A85E1EAA-4E4A-AA41-B11B-889D621159A5}"/>
+          <p:cNvPr id="61" name="Freeform 60">
+            <a:extLst>
+              <a:ext uri="{FF2B5EF4-FFF2-40B4-BE49-F238E27FC236}">
+                <a16:creationId xmlns:a16="http://schemas.microsoft.com/office/drawing/2014/main" id="{54252246-004C-1041-A45B-251A33B9577C}"/>
               </a:ext>
             </a:extLst>
           </p:cNvPr>
@@ -11693,9 +11693,9 @@
           <p:nvPr/>
         </p:nvSpPr>
         <p:spPr>
-          <a:xfrm rot="16200000" flipH="1" flipV="1">
-            <a:off x="1884443" y="1737903"/>
-            <a:ext cx="541853" cy="711200"/>
+          <a:xfrm rot="5400000" flipH="1">
+            <a:off x="2999537" y="994368"/>
+            <a:ext cx="204475" cy="530541"/>
           </a:xfrm>
           <a:custGeom>
             <a:avLst/>
@@ -11768,182 +11768,6 @@
           </a:p>
         </p:txBody>
       </p:sp>
-      <p:sp>
-        <p:nvSpPr>
-          <p:cNvPr id="59" name="Freeform 58">
-            <a:extLst>
-              <a:ext uri="{FF2B5EF4-FFF2-40B4-BE49-F238E27FC236}">
-                <a16:creationId xmlns:a16="http://schemas.microsoft.com/office/drawing/2014/main" id="{52454277-875B-3044-9953-B22851AC681C}"/>
-              </a:ext>
-            </a:extLst>
-          </p:cNvPr>
-          <p:cNvSpPr/>
-          <p:nvPr/>
-        </p:nvSpPr>
-        <p:spPr>
-          <a:xfrm rot="5400000" flipH="1" flipV="1">
-            <a:off x="1253988" y="2307509"/>
-            <a:ext cx="640461" cy="754299"/>
-          </a:xfrm>
-          <a:custGeom>
-            <a:avLst/>
-            <a:gdLst>
-              <a:gd name="connsiteX0" fmla="*/ 1371600 w 1371600"/>
-              <a:gd name="connsiteY0" fmla="*/ 711200 h 711200"/>
-              <a:gd name="connsiteX1" fmla="*/ 1371600 w 1371600"/>
-              <a:gd name="connsiteY1" fmla="*/ 0 h 711200"/>
-              <a:gd name="connsiteX2" fmla="*/ 0 w 1371600"/>
-              <a:gd name="connsiteY2" fmla="*/ 0 h 711200"/>
-            </a:gdLst>
-            <a:ahLst/>
-            <a:cxnLst>
-              <a:cxn ang="0">
-                <a:pos x="connsiteX0" y="connsiteY0"/>
-              </a:cxn>
-              <a:cxn ang="0">
-                <a:pos x="connsiteX1" y="connsiteY1"/>
-              </a:cxn>
-              <a:cxn ang="0">
-                <a:pos x="connsiteX2" y="connsiteY2"/>
-              </a:cxn>
-            </a:cxnLst>
-            <a:rect l="l" t="t" r="r" b="b"/>
-            <a:pathLst>
-              <a:path w="1371600" h="711200">
-                <a:moveTo>
-                  <a:pt x="1371600" y="711200"/>
-                </a:moveTo>
-                <a:lnTo>
-                  <a:pt x="1371600" y="0"/>
-                </a:lnTo>
-                <a:lnTo>
-                  <a:pt x="0" y="0"/>
-                </a:lnTo>
-              </a:path>
-            </a:pathLst>
-          </a:custGeom>
-          <a:noFill/>
-          <a:ln w="12700">
-            <a:solidFill>
-              <a:schemeClr val="tx2"/>
-            </a:solidFill>
-            <a:headEnd type="none" w="med" len="sm"/>
-            <a:tailEnd type="none" w="med" len="sm"/>
-          </a:ln>
-        </p:spPr>
-        <p:style>
-          <a:lnRef idx="2">
-            <a:schemeClr val="accent1">
-              <a:shade val="50000"/>
-            </a:schemeClr>
-          </a:lnRef>
-          <a:fillRef idx="1">
-            <a:schemeClr val="accent1"/>
-          </a:fillRef>
-          <a:effectRef idx="0">
-            <a:schemeClr val="accent1"/>
-          </a:effectRef>
-          <a:fontRef idx="minor">
-            <a:schemeClr val="lt1"/>
-          </a:fontRef>
-        </p:style>
-        <p:txBody>
-          <a:bodyPr rtlCol="0" anchor="ctr"/>
-          <a:lstStyle/>
-          <a:p>
-            <a:pPr algn="ctr"/>
-            <a:endParaRPr lang="en-US"/>
-          </a:p>
-        </p:txBody>
-      </p:sp>
-      <p:sp>
-        <p:nvSpPr>
-          <p:cNvPr id="61" name="Freeform 60">
-            <a:extLst>
-              <a:ext uri="{FF2B5EF4-FFF2-40B4-BE49-F238E27FC236}">
-                <a16:creationId xmlns:a16="http://schemas.microsoft.com/office/drawing/2014/main" id="{54252246-004C-1041-A45B-251A33B9577C}"/>
-              </a:ext>
-            </a:extLst>
-          </p:cNvPr>
-          <p:cNvSpPr/>
-          <p:nvPr/>
-        </p:nvSpPr>
-        <p:spPr>
-          <a:xfrm rot="5400000" flipH="1">
-            <a:off x="2999537" y="994368"/>
-            <a:ext cx="204475" cy="530541"/>
-          </a:xfrm>
-          <a:custGeom>
-            <a:avLst/>
-            <a:gdLst>
-              <a:gd name="connsiteX0" fmla="*/ 1371600 w 1371600"/>
-              <a:gd name="connsiteY0" fmla="*/ 711200 h 711200"/>
-              <a:gd name="connsiteX1" fmla="*/ 1371600 w 1371600"/>
-              <a:gd name="connsiteY1" fmla="*/ 0 h 711200"/>
-              <a:gd name="connsiteX2" fmla="*/ 0 w 1371600"/>
-              <a:gd name="connsiteY2" fmla="*/ 0 h 711200"/>
-            </a:gdLst>
-            <a:ahLst/>
-            <a:cxnLst>
-              <a:cxn ang="0">
-                <a:pos x="connsiteX0" y="connsiteY0"/>
-              </a:cxn>
-              <a:cxn ang="0">
-                <a:pos x="connsiteX1" y="connsiteY1"/>
-              </a:cxn>
-              <a:cxn ang="0">
-                <a:pos x="connsiteX2" y="connsiteY2"/>
-              </a:cxn>
-            </a:cxnLst>
-            <a:rect l="l" t="t" r="r" b="b"/>
-            <a:pathLst>
-              <a:path w="1371600" h="711200">
-                <a:moveTo>
-                  <a:pt x="1371600" y="711200"/>
-                </a:moveTo>
-                <a:lnTo>
-                  <a:pt x="1371600" y="0"/>
-                </a:lnTo>
-                <a:lnTo>
-                  <a:pt x="0" y="0"/>
-                </a:lnTo>
-              </a:path>
-            </a:pathLst>
-          </a:custGeom>
-          <a:noFill/>
-          <a:ln w="12700">
-            <a:solidFill>
-              <a:schemeClr val="tx2"/>
-            </a:solidFill>
-            <a:headEnd type="none" w="med" len="sm"/>
-            <a:tailEnd type="arrow" w="med" len="sm"/>
-          </a:ln>
-        </p:spPr>
-        <p:style>
-          <a:lnRef idx="2">
-            <a:schemeClr val="accent1">
-              <a:shade val="50000"/>
-            </a:schemeClr>
-          </a:lnRef>
-          <a:fillRef idx="1">
-            <a:schemeClr val="accent1"/>
-          </a:fillRef>
-          <a:effectRef idx="0">
-            <a:schemeClr val="accent1"/>
-          </a:effectRef>
-          <a:fontRef idx="minor">
-            <a:schemeClr val="lt1"/>
-          </a:fontRef>
-        </p:style>
-        <p:txBody>
-          <a:bodyPr rtlCol="0" anchor="ctr"/>
-          <a:lstStyle/>
-          <a:p>
-            <a:pPr algn="ctr"/>
-            <a:endParaRPr lang="en-US"/>
-          </a:p>
-        </p:txBody>
-      </p:sp>
       <p:cxnSp>
         <p:nvCxnSpPr>
           <p:cNvPr id="62" name="Elbow Connector 61">
@@ -12145,9 +11969,9 @@
           <p:nvPr/>
         </p:nvCxnSpPr>
         <p:spPr>
-          <a:xfrm rot="10800000">
-            <a:off x="1544190" y="3276601"/>
-            <a:ext cx="2463388" cy="455731"/>
+          <a:xfrm rot="10800000" flipV="1">
+            <a:off x="1544191" y="2854280"/>
+            <a:ext cx="1451509" cy="422322"/>
           </a:xfrm>
           <a:prstGeom prst="bentConnector3">
             <a:avLst>

</xml_diff>

<commit_message>
tweaks to data generation
</commit_message>
<xml_diff>
--- a/accelerators/stream_manager/docs/Master Images.pptx
+++ b/accelerators/stream_manager/docs/Master Images.pptx
@@ -200,7 +200,7 @@
           <a:p>
             <a:fld id="{C651EA68-8216-444B-A9B9-6AB7A53198D1}" type="datetimeFigureOut">
               <a:rPr lang="en-US" smtClean="0"/>
-              <a:t>2/26/20</a:t>
+              <a:t>2/27/20</a:t>
             </a:fld>
             <a:endParaRPr lang="en-US"/>
           </a:p>
@@ -782,7 +782,7 @@
           <a:p>
             <a:fld id="{0191ADAD-C447-434A-91E8-24A385BB7D2D}" type="datetimeFigureOut">
               <a:rPr lang="en-US" smtClean="0"/>
-              <a:t>2/26/20</a:t>
+              <a:t>2/27/20</a:t>
             </a:fld>
             <a:endParaRPr lang="en-US"/>
           </a:p>
@@ -980,7 +980,7 @@
           <a:p>
             <a:fld id="{0191ADAD-C447-434A-91E8-24A385BB7D2D}" type="datetimeFigureOut">
               <a:rPr lang="en-US" smtClean="0"/>
-              <a:t>2/26/20</a:t>
+              <a:t>2/27/20</a:t>
             </a:fld>
             <a:endParaRPr lang="en-US"/>
           </a:p>
@@ -1188,7 +1188,7 @@
           <a:p>
             <a:fld id="{0191ADAD-C447-434A-91E8-24A385BB7D2D}" type="datetimeFigureOut">
               <a:rPr lang="en-US" smtClean="0"/>
-              <a:t>2/26/20</a:t>
+              <a:t>2/27/20</a:t>
             </a:fld>
             <a:endParaRPr lang="en-US"/>
           </a:p>
@@ -1386,7 +1386,7 @@
           <a:p>
             <a:fld id="{0191ADAD-C447-434A-91E8-24A385BB7D2D}" type="datetimeFigureOut">
               <a:rPr lang="en-US" smtClean="0"/>
-              <a:t>2/26/20</a:t>
+              <a:t>2/27/20</a:t>
             </a:fld>
             <a:endParaRPr lang="en-US"/>
           </a:p>
@@ -1661,7 +1661,7 @@
           <a:p>
             <a:fld id="{0191ADAD-C447-434A-91E8-24A385BB7D2D}" type="datetimeFigureOut">
               <a:rPr lang="en-US" smtClean="0"/>
-              <a:t>2/26/20</a:t>
+              <a:t>2/27/20</a:t>
             </a:fld>
             <a:endParaRPr lang="en-US"/>
           </a:p>
@@ -1926,7 +1926,7 @@
           <a:p>
             <a:fld id="{0191ADAD-C447-434A-91E8-24A385BB7D2D}" type="datetimeFigureOut">
               <a:rPr lang="en-US" smtClean="0"/>
-              <a:t>2/26/20</a:t>
+              <a:t>2/27/20</a:t>
             </a:fld>
             <a:endParaRPr lang="en-US"/>
           </a:p>
@@ -2338,7 +2338,7 @@
           <a:p>
             <a:fld id="{0191ADAD-C447-434A-91E8-24A385BB7D2D}" type="datetimeFigureOut">
               <a:rPr lang="en-US" smtClean="0"/>
-              <a:t>2/26/20</a:t>
+              <a:t>2/27/20</a:t>
             </a:fld>
             <a:endParaRPr lang="en-US"/>
           </a:p>
@@ -2479,7 +2479,7 @@
           <a:p>
             <a:fld id="{0191ADAD-C447-434A-91E8-24A385BB7D2D}" type="datetimeFigureOut">
               <a:rPr lang="en-US" smtClean="0"/>
-              <a:t>2/26/20</a:t>
+              <a:t>2/27/20</a:t>
             </a:fld>
             <a:endParaRPr lang="en-US"/>
           </a:p>
@@ -2592,7 +2592,7 @@
           <a:p>
             <a:fld id="{0191ADAD-C447-434A-91E8-24A385BB7D2D}" type="datetimeFigureOut">
               <a:rPr lang="en-US" smtClean="0"/>
-              <a:t>2/26/20</a:t>
+              <a:t>2/27/20</a:t>
             </a:fld>
             <a:endParaRPr lang="en-US"/>
           </a:p>
@@ -2903,7 +2903,7 @@
           <a:p>
             <a:fld id="{0191ADAD-C447-434A-91E8-24A385BB7D2D}" type="datetimeFigureOut">
               <a:rPr lang="en-US" smtClean="0"/>
-              <a:t>2/26/20</a:t>
+              <a:t>2/27/20</a:t>
             </a:fld>
             <a:endParaRPr lang="en-US"/>
           </a:p>
@@ -3191,7 +3191,7 @@
           <a:p>
             <a:fld id="{0191ADAD-C447-434A-91E8-24A385BB7D2D}" type="datetimeFigureOut">
               <a:rPr lang="en-US" smtClean="0"/>
-              <a:t>2/26/20</a:t>
+              <a:t>2/27/20</a:t>
             </a:fld>
             <a:endParaRPr lang="en-US"/>
           </a:p>
@@ -3432,7 +3432,7 @@
           <a:p>
             <a:fld id="{0191ADAD-C447-434A-91E8-24A385BB7D2D}" type="datetimeFigureOut">
               <a:rPr lang="en-US" smtClean="0"/>
-              <a:t>2/26/20</a:t>
+              <a:t>2/27/20</a:t>
             </a:fld>
             <a:endParaRPr lang="en-US"/>
           </a:p>
@@ -8601,7 +8601,7 @@
         </p:nvSpPr>
         <p:spPr>
           <a:xfrm>
-            <a:off x="3775296" y="4810743"/>
+            <a:off x="3816089" y="5499686"/>
             <a:ext cx="3726469" cy="369332"/>
           </a:xfrm>
           <a:prstGeom prst="rect">
@@ -9925,6 +9925,56 @@
               <a:rPr lang="en-US" sz="1000" dirty="0"/>
               <a:t>deployment</a:t>
             </a:r>
+          </a:p>
+        </p:txBody>
+      </p:sp>
+      <p:sp>
+        <p:nvSpPr>
+          <p:cNvPr id="41" name="Rectangle 40">
+            <a:extLst>
+              <a:ext uri="{FF2B5EF4-FFF2-40B4-BE49-F238E27FC236}">
+                <a16:creationId xmlns:a16="http://schemas.microsoft.com/office/drawing/2014/main" id="{674DF804-04B5-EF4A-B225-9AFF090C5307}"/>
+              </a:ext>
+            </a:extLst>
+          </p:cNvPr>
+          <p:cNvSpPr/>
+          <p:nvPr/>
+        </p:nvSpPr>
+        <p:spPr>
+          <a:xfrm>
+            <a:off x="5454639" y="4833839"/>
+            <a:ext cx="179709" cy="153889"/>
+          </a:xfrm>
+          <a:prstGeom prst="rect">
+            <a:avLst/>
+          </a:prstGeom>
+          <a:noFill/>
+          <a:ln>
+            <a:noFill/>
+          </a:ln>
+        </p:spPr>
+        <p:style>
+          <a:lnRef idx="2">
+            <a:schemeClr val="accent1">
+              <a:shade val="50000"/>
+            </a:schemeClr>
+          </a:lnRef>
+          <a:fillRef idx="1">
+            <a:schemeClr val="accent1"/>
+          </a:fillRef>
+          <a:effectRef idx="0">
+            <a:schemeClr val="accent1"/>
+          </a:effectRef>
+          <a:fontRef idx="minor">
+            <a:schemeClr val="lt1"/>
+          </a:fontRef>
+        </p:style>
+        <p:txBody>
+          <a:bodyPr rtlCol="0" anchor="ctr"/>
+          <a:lstStyle/>
+          <a:p>
+            <a:pPr algn="ctr"/>
+            <a:endParaRPr lang="en-US"/>
           </a:p>
         </p:txBody>
       </p:sp>
@@ -12138,6 +12188,106 @@
                 <a:srgbClr val="5A6B86"/>
               </a:solidFill>
             </a:endParaRPr>
+          </a:p>
+        </p:txBody>
+      </p:sp>
+      <p:sp>
+        <p:nvSpPr>
+          <p:cNvPr id="3" name="Rectangle 2">
+            <a:extLst>
+              <a:ext uri="{FF2B5EF4-FFF2-40B4-BE49-F238E27FC236}">
+                <a16:creationId xmlns:a16="http://schemas.microsoft.com/office/drawing/2014/main" id="{5CDD3F24-7639-3949-8AC5-D530C98DC927}"/>
+              </a:ext>
+            </a:extLst>
+          </p:cNvPr>
+          <p:cNvSpPr/>
+          <p:nvPr/>
+        </p:nvSpPr>
+        <p:spPr>
+          <a:xfrm>
+            <a:off x="10121806" y="2102426"/>
+            <a:ext cx="179709" cy="153889"/>
+          </a:xfrm>
+          <a:prstGeom prst="rect">
+            <a:avLst/>
+          </a:prstGeom>
+          <a:noFill/>
+          <a:ln>
+            <a:noFill/>
+          </a:ln>
+        </p:spPr>
+        <p:style>
+          <a:lnRef idx="2">
+            <a:schemeClr val="accent1">
+              <a:shade val="50000"/>
+            </a:schemeClr>
+          </a:lnRef>
+          <a:fillRef idx="1">
+            <a:schemeClr val="accent1"/>
+          </a:fillRef>
+          <a:effectRef idx="0">
+            <a:schemeClr val="accent1"/>
+          </a:effectRef>
+          <a:fontRef idx="minor">
+            <a:schemeClr val="lt1"/>
+          </a:fontRef>
+        </p:style>
+        <p:txBody>
+          <a:bodyPr rtlCol="0" anchor="ctr"/>
+          <a:lstStyle/>
+          <a:p>
+            <a:pPr algn="ctr"/>
+            <a:endParaRPr lang="en-US"/>
+          </a:p>
+        </p:txBody>
+      </p:sp>
+      <p:sp>
+        <p:nvSpPr>
+          <p:cNvPr id="58" name="Rectangle 57">
+            <a:extLst>
+              <a:ext uri="{FF2B5EF4-FFF2-40B4-BE49-F238E27FC236}">
+                <a16:creationId xmlns:a16="http://schemas.microsoft.com/office/drawing/2014/main" id="{C29587FD-AD84-DB43-89D0-3A0D9B1CA05D}"/>
+              </a:ext>
+            </a:extLst>
+          </p:cNvPr>
+          <p:cNvSpPr/>
+          <p:nvPr/>
+        </p:nvSpPr>
+        <p:spPr>
+          <a:xfrm>
+            <a:off x="6096000" y="4315116"/>
+            <a:ext cx="179709" cy="153889"/>
+          </a:xfrm>
+          <a:prstGeom prst="rect">
+            <a:avLst/>
+          </a:prstGeom>
+          <a:noFill/>
+          <a:ln>
+            <a:noFill/>
+          </a:ln>
+        </p:spPr>
+        <p:style>
+          <a:lnRef idx="2">
+            <a:schemeClr val="accent1">
+              <a:shade val="50000"/>
+            </a:schemeClr>
+          </a:lnRef>
+          <a:fillRef idx="1">
+            <a:schemeClr val="accent1"/>
+          </a:fillRef>
+          <a:effectRef idx="0">
+            <a:schemeClr val="accent1"/>
+          </a:effectRef>
+          <a:fontRef idx="minor">
+            <a:schemeClr val="lt1"/>
+          </a:fontRef>
+        </p:style>
+        <p:txBody>
+          <a:bodyPr rtlCol="0" anchor="ctr"/>
+          <a:lstStyle/>
+          <a:p>
+            <a:pPr algn="ctr"/>
+            <a:endParaRPr lang="en-US"/>
           </a:p>
         </p:txBody>
       </p:sp>

</xml_diff>